<commit_message>
change presentation and .jar
</commit_message>
<xml_diff>
--- a/documents/presentation.pptx
+++ b/documents/presentation.pptx
@@ -3572,15 +3572,20 @@
             <p:ph type="title"/>
           </p:nvPr>
         </p:nvSpPr>
-        <p:spPr/>
+        <p:spPr>
+          <a:xfrm>
+            <a:off x="609600" y="8573"/>
+            <a:ext cx="10972800" cy="1143000"/>
+          </a:xfrm>
+        </p:spPr>
         <p:txBody>
           <a:bodyPr/>
           <a:p>
             <a:r>
-              <a:rPr lang="x-none" altLang="en-US"/>
+              <a:rPr lang="x-none" altLang="en-US" sz="3600"/>
               <a:t>Определение меандра</a:t>
             </a:r>
-            <a:endParaRPr lang="x-none" altLang="en-US"/>
+            <a:endParaRPr lang="x-none" altLang="en-US" sz="3600"/>
           </a:p>
         </p:txBody>
       </p:sp>
@@ -3596,14 +3601,17 @@
         </p:nvSpPr>
         <p:spPr>
           <a:xfrm>
-            <a:off x="210820" y="1600200"/>
-            <a:ext cx="11771630" cy="4526280"/>
+            <a:off x="210820" y="1017905"/>
+            <a:ext cx="11771630" cy="4876165"/>
           </a:xfrm>
         </p:spPr>
         <p:txBody>
           <a:bodyPr/>
           <a:p>
             <a:pPr marL="0" indent="0">
+              <a:lnSpc>
+                <a:spcPct val="100000"/>
+              </a:lnSpc>
               <a:buNone/>
             </a:pPr>
             <a:r>
@@ -3614,6 +3622,18 @@
           </a:p>
           <a:p>
             <a:pPr marL="0" indent="0">
+              <a:lnSpc>
+                <a:spcPct val="100000"/>
+              </a:lnSpc>
+              <a:buNone/>
+            </a:pPr>
+            <a:endParaRPr lang="en-US" sz="1800"/>
+          </a:p>
+          <a:p>
+            <a:pPr marL="0" indent="0">
+              <a:lnSpc>
+                <a:spcPct val="100000"/>
+              </a:lnSpc>
               <a:buNone/>
             </a:pPr>
             <a:r>
@@ -3624,6 +3644,9 @@
           </a:p>
           <a:p>
             <a:pPr marL="0" indent="0">
+              <a:lnSpc>
+                <a:spcPct val="100000"/>
+              </a:lnSpc>
               <a:buNone/>
             </a:pPr>
             <a:r>
@@ -3634,6 +3657,9 @@
           </a:p>
           <a:p>
             <a:pPr marL="0" indent="0">
+              <a:lnSpc>
+                <a:spcPct val="100000"/>
+              </a:lnSpc>
               <a:buNone/>
             </a:pPr>
             <a:r>
@@ -3644,6 +3670,9 @@
           </a:p>
           <a:p>
             <a:pPr marL="0" indent="0">
+              <a:lnSpc>
+                <a:spcPct val="100000"/>
+              </a:lnSpc>
               <a:buNone/>
             </a:pPr>
             <a:r>
@@ -3654,41 +3683,49 @@
           </a:p>
           <a:p>
             <a:pPr marL="0" indent="0">
+              <a:lnSpc>
+                <a:spcPct val="100000"/>
+              </a:lnSpc>
               <a:buNone/>
             </a:pPr>
             <a:r>
               <a:rPr lang="en-US" sz="1800"/>
-              <a:t>река могла бы задавать другую перестановку . Но далеко не любая перестановка чисел</a:t>
+              <a:t>река могла бы задавать другую перестановку . </a:t>
             </a:r>
             <a:endParaRPr lang="en-US" sz="1800"/>
           </a:p>
           <a:p>
             <a:pPr marL="0" indent="0">
+              <a:lnSpc>
+                <a:spcPct val="100000"/>
+              </a:lnSpc>
               <a:buNone/>
             </a:pPr>
             <a:r>
               <a:rPr lang="en-US" sz="1800"/>
-              <a:t>(мостов) может быть реализована таким образом. Например, не придумать реку,</a:t>
+              <a:t>Но далеко не любая перестановка чисел (мостов) может быть реализована таким образом. Например, не придумать реку, проходящую через мосты в порядке 2,1,3,4,5. </a:t>
             </a:r>
             <a:endParaRPr lang="en-US" sz="1800"/>
           </a:p>
           <a:p>
             <a:pPr marL="0" indent="0">
+              <a:lnSpc>
+                <a:spcPct val="100000"/>
+              </a:lnSpc>
               <a:buNone/>
             </a:pPr>
+            <a:endParaRPr lang="en-US" sz="1800"/>
+          </a:p>
+          <a:p>
+            <a:pPr marL="0" indent="0">
+              <a:lnSpc>
+                <a:spcPct val="100000"/>
+              </a:lnSpc>
+              <a:buNone/>
+            </a:pPr>
             <a:r>
               <a:rPr lang="en-US" sz="1800"/>
-              <a:t>проходящую через мосты в порядке 2,1,3,4,5. Будем называть перестановку меандром,</a:t>
-            </a:r>
-            <a:endParaRPr lang="en-US" sz="1800"/>
-          </a:p>
-          <a:p>
-            <a:pPr marL="0" indent="0">
-              <a:buNone/>
-            </a:pPr>
-            <a:r>
-              <a:rPr lang="en-US" sz="1800"/>
-              <a:t>если ее можно задать с помощью подходящей реки.</a:t>
+              <a:t>Будем называть перестановку меандром, если ее можно задать с помощью подходящей реки.</a:t>
             </a:r>
             <a:endParaRPr lang="en-US" sz="1800"/>
           </a:p>
@@ -3710,7 +3747,7 @@
         </p:blipFill>
         <p:spPr>
           <a:xfrm>
-            <a:off x="3820795" y="4760595"/>
+            <a:off x="3837305" y="4810125"/>
             <a:ext cx="4312920" cy="1766570"/>
           </a:xfrm>
           <a:prstGeom prst="rect">
@@ -3756,10 +3793,10 @@
           <a:bodyPr/>
           <a:p>
             <a:r>
-              <a:rPr lang="x-none" altLang="en-US" sz="3200"/>
+              <a:rPr lang="x-none" altLang="en-US" sz="3600"/>
               <a:t>Решение первой задачи</a:t>
             </a:r>
-            <a:endParaRPr lang="x-none" altLang="en-US" sz="3200"/>
+            <a:endParaRPr lang="x-none" altLang="en-US" sz="3600"/>
           </a:p>
         </p:txBody>
       </p:sp>
@@ -3926,7 +3963,7 @@
         <p:spPr>
           <a:xfrm>
             <a:off x="401320" y="2287270"/>
-            <a:ext cx="11440160" cy="3749040"/>
+            <a:ext cx="11440160" cy="4358640"/>
           </a:xfrm>
           <a:prstGeom prst="rect">
             <a:avLst/>
@@ -3940,7 +3977,7 @@
           <a:p>
             <a:r>
               <a:rPr lang="x-none" altLang="en-US" sz="2000"/>
-              <a:t>1) Создадим переменную-флаг, которая отмечает "снизу" или "сверху" мы прищли к i-ому элементу.</a:t>
+              <a:t>1) Создадим переменную-флаг, которая отмечает "снизу" или "сверху" мы пришли к i-ому элементу.</a:t>
             </a:r>
             <a:endParaRPr lang="x-none" altLang="en-US" sz="2000"/>
           </a:p>
@@ -3982,6 +4019,12 @@
               <a:rPr lang="x-none" altLang="en-US" sz="2000"/>
               <a:t>5) Если попадает, то проверяем предыдущий элемент, и если он не в отрезке, то это пересечение.</a:t>
             </a:r>
+            <a:endParaRPr lang="x-none" altLang="en-US" sz="2000"/>
+          </a:p>
+          <a:p>
+            <a:endParaRPr lang="x-none" altLang="en-US" sz="2000"/>
+          </a:p>
+          <a:p>
             <a:endParaRPr lang="x-none" altLang="en-US" sz="2000"/>
           </a:p>
         </p:txBody>
@@ -4040,7 +4083,7 @@
         <p:spPr>
           <a:xfrm>
             <a:off x="151130" y="938530"/>
-            <a:ext cx="9327515" cy="5029200"/>
+            <a:ext cx="9327515" cy="5577840"/>
           </a:xfrm>
           <a:prstGeom prst="rect">
             <a:avLst/>
@@ -4092,7 +4135,17 @@
           <a:p>
             <a:r>
               <a:rPr lang="x-none" altLang="en-US"/>
-              <a:t>Массив верхних отрезков (М): пустой</a:t>
+              <a:t>Массив верхних отрезков (В): пустой</a:t>
+            </a:r>
+            <a:endParaRPr lang="x-none" altLang="en-US"/>
+          </a:p>
+          <a:p>
+            <a:endParaRPr lang="x-none" altLang="en-US"/>
+          </a:p>
+          <a:p>
+            <a:r>
+              <a:rPr lang="x-none" altLang="en-US"/>
+              <a:t>Идем в цикле по перестановке.</a:t>
             </a:r>
             <a:endParaRPr lang="x-none" altLang="en-US"/>
           </a:p>
@@ -4119,7 +4172,7 @@
           <a:p>
             <a:r>
               <a:rPr lang="x-none" altLang="en-US"/>
-              <a:t>2) 4 не попадает в отрезки, поэтому просто добавляем в М [3,4], </a:t>
+              <a:t>2) 4 не попадает в отрезки, поэтому просто добавляем в В [3,4], </a:t>
             </a:r>
             <a:endParaRPr lang="x-none" altLang="en-US"/>
           </a:p>
@@ -4130,19 +4183,15 @@
               </a:rPr>
               <a:t>меняем флаг на "снизу" и левую границу на 4.</a:t>
             </a:r>
+            <a:endParaRPr lang="x-none" altLang="en-US"/>
+          </a:p>
+          <a:p>
+            <a:endParaRPr lang="x-none" altLang="en-US"/>
+          </a:p>
+          <a:p>
             <a:r>
               <a:rPr lang="x-none" altLang="en-US"/>
-              <a:t>]</a:t>
-            </a:r>
-            <a:endParaRPr lang="x-none" altLang="en-US"/>
-          </a:p>
-          <a:p>
-            <a:endParaRPr lang="x-none" altLang="en-US"/>
-          </a:p>
-          <a:p>
-            <a:r>
-              <a:rPr lang="x-none" altLang="en-US"/>
-              <a:t>3) К 2 мы пришли снизу и попадаем в отрезок Н - [1,3]. </a:t>
+              <a:t>3) К 2 мы пришли снизу и попадаем в отрезок содержащийся в Н - [1,3]. </a:t>
             </a:r>
             <a:endParaRPr lang="x-none" altLang="en-US"/>
           </a:p>
@@ -4323,7 +4372,7 @@
         </p:nvSpPr>
         <p:spPr>
           <a:xfrm>
-            <a:off x="10242550" y="2054225"/>
+            <a:off x="10342880" y="2021205"/>
             <a:ext cx="483235" cy="365760"/>
           </a:xfrm>
           <a:prstGeom prst="rect">
@@ -4352,7 +4401,7 @@
         </p:nvSpPr>
         <p:spPr>
           <a:xfrm>
-            <a:off x="9403715" y="2081530"/>
+            <a:off x="9470390" y="2014855"/>
             <a:ext cx="483235" cy="365760"/>
           </a:xfrm>
           <a:prstGeom prst="rect">
@@ -4381,7 +4430,7 @@
         </p:nvSpPr>
         <p:spPr>
           <a:xfrm>
-            <a:off x="8580755" y="2075815"/>
+            <a:off x="8679815" y="2026285"/>
             <a:ext cx="483235" cy="365760"/>
           </a:xfrm>
           <a:prstGeom prst="rect">
@@ -4410,7 +4459,7 @@
         </p:nvSpPr>
         <p:spPr>
           <a:xfrm>
-            <a:off x="7840980" y="2053590"/>
+            <a:off x="7956550" y="2020570"/>
             <a:ext cx="483235" cy="365760"/>
           </a:xfrm>
           <a:prstGeom prst="rect">
@@ -4439,7 +4488,7 @@
         </p:nvCxnSpPr>
         <p:spPr>
           <a:xfrm>
-            <a:off x="7861300" y="2687320"/>
+            <a:off x="7861300" y="3001010"/>
             <a:ext cx="1665605" cy="0"/>
           </a:xfrm>
           <a:prstGeom prst="line">
@@ -4544,7 +4593,7 @@
         </p:nvSpPr>
         <p:spPr>
           <a:xfrm>
-            <a:off x="9076690" y="2138045"/>
+            <a:off x="9177020" y="2204085"/>
             <a:ext cx="383540" cy="579120"/>
           </a:xfrm>
           <a:prstGeom prst="rect">
@@ -4603,6 +4652,66 @@
           </a:p>
         </p:txBody>
       </p:sp>
+      <p:cxnSp>
+        <p:nvCxnSpPr>
+          <p:cNvPr id="17" name="Straight Connector 16"/>
+          <p:cNvCxnSpPr/>
+          <p:nvPr/>
+        </p:nvCxnSpPr>
+        <p:spPr>
+          <a:xfrm>
+            <a:off x="9526270" y="1471295"/>
+            <a:ext cx="0" cy="1532255"/>
+          </a:xfrm>
+          <a:prstGeom prst="line">
+            <a:avLst/>
+          </a:prstGeom>
+        </p:spPr>
+        <p:style>
+          <a:lnRef idx="1">
+            <a:schemeClr val="dk1"/>
+          </a:lnRef>
+          <a:fillRef idx="0">
+            <a:schemeClr val="dk1"/>
+          </a:fillRef>
+          <a:effectRef idx="0">
+            <a:schemeClr val="dk1"/>
+          </a:effectRef>
+          <a:fontRef idx="minor">
+            <a:schemeClr val="tx1"/>
+          </a:fontRef>
+        </p:style>
+      </p:cxnSp>
+      <p:cxnSp>
+        <p:nvCxnSpPr>
+          <p:cNvPr id="19" name="Straight Connector 18"/>
+          <p:cNvCxnSpPr/>
+          <p:nvPr/>
+        </p:nvCxnSpPr>
+        <p:spPr>
+          <a:xfrm>
+            <a:off x="10353040" y="1465580"/>
+            <a:ext cx="6350" cy="955040"/>
+          </a:xfrm>
+          <a:prstGeom prst="line">
+            <a:avLst/>
+          </a:prstGeom>
+        </p:spPr>
+        <p:style>
+          <a:lnRef idx="1">
+            <a:schemeClr val="dk1"/>
+          </a:lnRef>
+          <a:fillRef idx="0">
+            <a:schemeClr val="dk1"/>
+          </a:fillRef>
+          <a:effectRef idx="0">
+            <a:schemeClr val="dk1"/>
+          </a:effectRef>
+          <a:fontRef idx="minor">
+            <a:schemeClr val="tx1"/>
+          </a:fontRef>
+        </p:style>
+      </p:cxnSp>
     </p:spTree>
   </p:cSld>
   <p:clrMapOvr>
@@ -4641,10 +4750,10 @@
           <a:bodyPr/>
           <a:p>
             <a:r>
-              <a:rPr lang="x-none" altLang="en-US" sz="3200"/>
+              <a:rPr lang="x-none" altLang="en-US" sz="3600"/>
               <a:t>Решение второй задачи</a:t>
             </a:r>
-            <a:endParaRPr lang="x-none" altLang="en-US" sz="3200"/>
+            <a:endParaRPr lang="x-none" altLang="en-US" sz="3600"/>
           </a:p>
         </p:txBody>
       </p:sp>
@@ -4775,10 +4884,10 @@
           <a:bodyPr/>
           <a:p>
             <a:r>
-              <a:rPr lang="x-none" altLang="en-US" sz="3200"/>
+              <a:rPr lang="x-none" altLang="en-US" sz="3600"/>
               <a:t>Решение второй задачи</a:t>
             </a:r>
-            <a:endParaRPr lang="x-none" altLang="en-US" sz="3200"/>
+            <a:endParaRPr lang="x-none" altLang="en-US" sz="3600"/>
           </a:p>
         </p:txBody>
       </p:sp>
@@ -5322,7 +5431,7 @@
         <p:spPr>
           <a:xfrm>
             <a:off x="260350" y="4912995"/>
-            <a:ext cx="11425555" cy="1280160"/>
+            <a:ext cx="11425555" cy="1584960"/>
           </a:xfrm>
           <a:prstGeom prst="rect">
             <a:avLst/>
@@ -5343,7 +5452,14 @@
           <a:p>
             <a:r>
               <a:rPr lang="x-none" altLang="en-US" sz="2000"/>
-              <a:t>После чего собираем обратно в один массив и облегченной проверкой проверяем на пересечения.</a:t>
+              <a:t>После чего собираем обратно в один массив и проверяем на пересечения. </a:t>
+            </a:r>
+            <a:endParaRPr lang="x-none" altLang="en-US" sz="2000"/>
+          </a:p>
+          <a:p>
+            <a:r>
+              <a:rPr lang="x-none" altLang="en-US" sz="2000"/>
+              <a:t>Данный алгоритм будет генерировать сразу перестановки с чередующейся четностью элементов.</a:t>
             </a:r>
             <a:endParaRPr lang="x-none" altLang="en-US" sz="2000"/>
           </a:p>
@@ -5385,10 +5501,10 @@
           <a:bodyPr/>
           <a:p>
             <a:r>
-              <a:rPr lang="x-none" altLang="en-US"/>
+              <a:rPr lang="x-none" altLang="en-US" sz="3600"/>
               <a:t>Используемые технологии</a:t>
             </a:r>
-            <a:endParaRPr lang="x-none" altLang="en-US"/>
+            <a:endParaRPr lang="x-none" altLang="en-US" sz="3600"/>
           </a:p>
         </p:txBody>
       </p:sp>

</xml_diff>

<commit_message>
change presentation and .jar; add generated
</commit_message>
<xml_diff>
--- a/documents/presentation.pptx
+++ b/documents/presentation.pptx
@@ -5,7 +5,7 @@
     <p:sldMasterId id="2147483648" r:id="rId1"/>
   </p:sldMasterIdLst>
   <p:notesMasterIdLst>
-    <p:notesMasterId r:id="rId12"/>
+    <p:notesMasterId r:id="rId13"/>
   </p:notesMasterIdLst>
   <p:sldIdLst>
     <p:sldId id="256" r:id="rId3"/>
@@ -16,7 +16,8 @@
     <p:sldId id="280" r:id="rId8"/>
     <p:sldId id="260" r:id="rId9"/>
     <p:sldId id="278" r:id="rId10"/>
-    <p:sldId id="262" r:id="rId11"/>
+    <p:sldId id="284" r:id="rId11"/>
+    <p:sldId id="262" r:id="rId12"/>
   </p:sldIdLst>
   <p:sldSz cx="12192000" cy="6858000"/>
   <p:notesSz cx="6858000" cy="9144000"/>
@@ -3475,6 +3476,117 @@
 </p:sld>
 </file>
 
+<file path=ppt/slides/slide10.xml><?xml version="1.0" encoding="utf-8"?>
+<p:sld xmlns:a="http://schemas.openxmlformats.org/drawingml/2006/main" xmlns:r="http://schemas.openxmlformats.org/officeDocument/2006/relationships" xmlns:p="http://schemas.openxmlformats.org/presentationml/2006/main">
+  <p:cSld>
+    <p:spTree>
+      <p:nvGrpSpPr>
+        <p:cNvPr id="1" name=""/>
+        <p:cNvGrpSpPr/>
+        <p:nvPr/>
+      </p:nvGrpSpPr>
+      <p:grpSpPr/>
+      <p:sp>
+        <p:nvSpPr>
+          <p:cNvPr id="2" name="Title 1"/>
+          <p:cNvSpPr>
+            <a:spLocks noGrp="1"/>
+          </p:cNvSpPr>
+          <p:nvPr>
+            <p:ph type="title"/>
+          </p:nvPr>
+        </p:nvSpPr>
+        <p:spPr/>
+        <p:txBody>
+          <a:bodyPr/>
+          <a:p>
+            <a:r>
+              <a:rPr lang="x-none" altLang="en-US" sz="3600"/>
+              <a:t>Используемые технологии</a:t>
+            </a:r>
+            <a:endParaRPr lang="x-none" altLang="en-US" sz="3600"/>
+          </a:p>
+        </p:txBody>
+      </p:sp>
+      <p:sp>
+        <p:nvSpPr>
+          <p:cNvPr id="3" name="Content Placeholder 2"/>
+          <p:cNvSpPr>
+            <a:spLocks noGrp="1"/>
+          </p:cNvSpPr>
+          <p:nvPr>
+            <p:ph idx="1"/>
+          </p:nvPr>
+        </p:nvSpPr>
+        <p:spPr/>
+        <p:txBody>
+          <a:bodyPr/>
+          <a:p>
+            <a:pPr marL="0" indent="0">
+              <a:buNone/>
+            </a:pPr>
+            <a:r>
+              <a:rPr lang="x-none" altLang="en-US"/>
+              <a:t>В качестве основного языка программирования выбран Java. </a:t>
+            </a:r>
+            <a:endParaRPr lang="x-none" altLang="en-US"/>
+          </a:p>
+          <a:p>
+            <a:pPr marL="0" indent="0">
+              <a:buNone/>
+            </a:pPr>
+            <a:r>
+              <a:rPr lang="x-none" altLang="en-US"/>
+              <a:t>Выбор был сделан опираясь на главное преимущество этого языка - мультиплатформенность.</a:t>
+            </a:r>
+            <a:endParaRPr lang="x-none" altLang="en-US"/>
+          </a:p>
+          <a:p>
+            <a:pPr marL="0" indent="0">
+              <a:buNone/>
+            </a:pPr>
+            <a:endParaRPr lang="x-none" altLang="en-US"/>
+          </a:p>
+          <a:p>
+            <a:pPr marL="0" indent="0">
+              <a:buNone/>
+            </a:pPr>
+            <a:endParaRPr lang="x-none" altLang="en-US"/>
+          </a:p>
+        </p:txBody>
+      </p:sp>
+      <p:pic>
+        <p:nvPicPr>
+          <p:cNvPr id="5" name="Picture 4"/>
+          <p:cNvPicPr>
+            <a:picLocks noChangeAspect="1"/>
+          </p:cNvPicPr>
+          <p:nvPr/>
+        </p:nvPicPr>
+        <p:blipFill>
+          <a:blip r:embed="rId1"/>
+          <a:stretch>
+            <a:fillRect/>
+          </a:stretch>
+        </p:blipFill>
+        <p:spPr>
+          <a:xfrm>
+            <a:off x="7709535" y="2826385"/>
+            <a:ext cx="3934460" cy="3934460"/>
+          </a:xfrm>
+          <a:prstGeom prst="rect">
+            <a:avLst/>
+          </a:prstGeom>
+        </p:spPr>
+      </p:pic>
+    </p:spTree>
+  </p:cSld>
+  <p:clrMapOvr>
+    <a:masterClrMapping/>
+  </p:clrMapOvr>
+</p:sld>
+</file>
+
 <file path=ppt/slides/slide2.xml><?xml version="1.0" encoding="utf-8"?>
 <p:sld xmlns:a="http://schemas.openxmlformats.org/drawingml/2006/main" xmlns:r="http://schemas.openxmlformats.org/officeDocument/2006/relationships" xmlns:p="http://schemas.openxmlformats.org/presentationml/2006/main">
   <p:cSld>
@@ -3519,7 +3631,7 @@
         </p:nvSpPr>
         <p:spPr>
           <a:xfrm>
-            <a:off x="609600" y="2416810"/>
+            <a:off x="609600" y="1640840"/>
             <a:ext cx="10972800" cy="2710815"/>
           </a:xfrm>
         </p:spPr>
@@ -3544,6 +3656,31 @@
           </a:p>
         </p:txBody>
       </p:sp>
+      <p:pic>
+        <p:nvPicPr>
+          <p:cNvPr id="16" name="Picture 15"/>
+          <p:cNvPicPr>
+            <a:picLocks noChangeAspect="1"/>
+          </p:cNvPicPr>
+          <p:nvPr/>
+        </p:nvPicPr>
+        <p:blipFill>
+          <a:blip r:embed="rId1"/>
+          <a:srcRect l="27739" t="-626" r="30602" b="626"/>
+          <a:stretch>
+            <a:fillRect/>
+          </a:stretch>
+        </p:blipFill>
+        <p:spPr>
+          <a:xfrm>
+            <a:off x="4694555" y="3968115"/>
+            <a:ext cx="3150870" cy="2635885"/>
+          </a:xfrm>
+          <a:prstGeom prst="rect">
+            <a:avLst/>
+          </a:prstGeom>
+        </p:spPr>
+      </p:pic>
     </p:spTree>
   </p:cSld>
   <p:clrMapOvr>
@@ -3809,7 +3946,7 @@
         <p:spPr>
           <a:xfrm>
             <a:off x="465455" y="1017270"/>
-            <a:ext cx="11309350" cy="3017520"/>
+            <a:ext cx="11309350" cy="2011680"/>
           </a:xfrm>
           <a:prstGeom prst="rect">
             <a:avLst/>
@@ -3822,64 +3959,997 @@
           </a:bodyPr>
           <a:p>
             <a:r>
-              <a:rPr lang="x-none" altLang="en-US" sz="2400"/>
+              <a:rPr lang="x-none" altLang="en-US"/>
               <a:t>Проведя исследование, я заметил, что меандр должен соответствовать двум условиям:</a:t>
             </a:r>
-            <a:endParaRPr lang="x-none" altLang="en-US" sz="2400"/>
-          </a:p>
-          <a:p>
-            <a:endParaRPr lang="x-none" altLang="en-US" sz="2400"/>
-          </a:p>
-          <a:p>
-            <a:r>
-              <a:rPr lang="x-none" altLang="en-US" sz="2400"/>
+            <a:endParaRPr lang="x-none" altLang="en-US"/>
+          </a:p>
+          <a:p>
+            <a:endParaRPr lang="x-none" altLang="en-US"/>
+          </a:p>
+          <a:p>
+            <a:r>
+              <a:rPr lang="x-none" altLang="en-US"/>
               <a:t>1) Начинаться с нечетного моста</a:t>
             </a:r>
-            <a:endParaRPr lang="x-none" altLang="en-US" sz="2400"/>
-          </a:p>
-          <a:p>
-            <a:r>
-              <a:rPr lang="x-none" altLang="en-US" sz="2400"/>
+            <a:endParaRPr lang="x-none" altLang="en-US"/>
+          </a:p>
+          <a:p>
+            <a:r>
+              <a:rPr lang="x-none" altLang="en-US"/>
               <a:t>2) Дальше четные и нечетные мосты должны чередоваться</a:t>
             </a:r>
-            <a:endParaRPr lang="x-none" altLang="en-US" sz="2400"/>
-          </a:p>
-          <a:p>
-            <a:endParaRPr lang="x-none" altLang="en-US" sz="2400"/>
-          </a:p>
-          <a:p>
-            <a:r>
-              <a:rPr lang="x-none" altLang="en-US" sz="2400"/>
+            <a:endParaRPr lang="x-none" altLang="en-US"/>
+          </a:p>
+          <a:p>
+            <a:endParaRPr lang="x-none" altLang="en-US"/>
+          </a:p>
+          <a:p>
+            <a:r>
+              <a:rPr lang="x-none" altLang="en-US"/>
               <a:t>То есть четность позиции (если считать с 1) должна соответствовать четности номера моста.</a:t>
             </a:r>
-            <a:endParaRPr lang="x-none" altLang="en-US" sz="2400"/>
-          </a:p>
-        </p:txBody>
-      </p:sp>
-      <p:pic>
-        <p:nvPicPr>
-          <p:cNvPr id="16" name="Picture 15"/>
-          <p:cNvPicPr>
-            <a:picLocks noChangeAspect="1"/>
-          </p:cNvPicPr>
+            <a:endParaRPr lang="x-none" altLang="en-US"/>
+          </a:p>
+        </p:txBody>
+      </p:sp>
+      <p:sp>
+        <p:nvSpPr>
+          <p:cNvPr id="3" name="Text Box 2"/>
+          <p:cNvSpPr txBox="1"/>
           <p:nvPr/>
-        </p:nvPicPr>
-        <p:blipFill>
-          <a:blip r:embed="rId1"/>
-          <a:stretch>
-            <a:fillRect/>
-          </a:stretch>
-        </p:blipFill>
-        <p:spPr>
-          <a:xfrm>
-            <a:off x="2346325" y="4017645"/>
-            <a:ext cx="7563485" cy="2635885"/>
+        </p:nvSpPr>
+        <p:spPr>
+          <a:xfrm>
+            <a:off x="467995" y="3185795"/>
+            <a:ext cx="11242040" cy="365760"/>
           </a:xfrm>
           <a:prstGeom prst="rect">
             <a:avLst/>
           </a:prstGeom>
-        </p:spPr>
-      </p:pic>
+          <a:noFill/>
+        </p:spPr>
+        <p:txBody>
+          <a:bodyPr wrap="square" rtlCol="0">
+            <a:spAutoFit/>
+          </a:bodyPr>
+          <a:p>
+            <a:r>
+              <a:rPr lang="x-none" altLang="en-US"/>
+              <a:t>Иначе возникают меандры, к которым "не подойти": </a:t>
+            </a:r>
+            <a:endParaRPr lang="x-none" altLang="en-US"/>
+          </a:p>
+        </p:txBody>
+      </p:sp>
+      <p:cxnSp>
+        <p:nvCxnSpPr>
+          <p:cNvPr id="4" name="Straight Connector 3"/>
+          <p:cNvCxnSpPr/>
+          <p:nvPr/>
+        </p:nvCxnSpPr>
+        <p:spPr>
+          <a:xfrm>
+            <a:off x="798830" y="4786630"/>
+            <a:ext cx="4113530" cy="0"/>
+          </a:xfrm>
+          <a:prstGeom prst="line">
+            <a:avLst/>
+          </a:prstGeom>
+        </p:spPr>
+        <p:style>
+          <a:lnRef idx="1">
+            <a:schemeClr val="accent1"/>
+          </a:lnRef>
+          <a:fillRef idx="0">
+            <a:schemeClr val="accent1"/>
+          </a:fillRef>
+          <a:effectRef idx="0">
+            <a:schemeClr val="accent1"/>
+          </a:effectRef>
+          <a:fontRef idx="minor">
+            <a:schemeClr val="tx1"/>
+          </a:fontRef>
+        </p:style>
+      </p:cxnSp>
+      <p:cxnSp>
+        <p:nvCxnSpPr>
+          <p:cNvPr id="5" name="Straight Connector 4"/>
+          <p:cNvCxnSpPr/>
+          <p:nvPr/>
+        </p:nvCxnSpPr>
+        <p:spPr>
+          <a:xfrm>
+            <a:off x="1515110" y="4686935"/>
+            <a:ext cx="0" cy="249555"/>
+          </a:xfrm>
+          <a:prstGeom prst="line">
+            <a:avLst/>
+          </a:prstGeom>
+        </p:spPr>
+        <p:style>
+          <a:lnRef idx="1">
+            <a:schemeClr val="accent1"/>
+          </a:lnRef>
+          <a:fillRef idx="0">
+            <a:schemeClr val="accent1"/>
+          </a:fillRef>
+          <a:effectRef idx="0">
+            <a:schemeClr val="accent1"/>
+          </a:effectRef>
+          <a:fontRef idx="minor">
+            <a:schemeClr val="tx1"/>
+          </a:fontRef>
+        </p:style>
+      </p:cxnSp>
+      <p:cxnSp>
+        <p:nvCxnSpPr>
+          <p:cNvPr id="7" name="Straight Connector 6"/>
+          <p:cNvCxnSpPr/>
+          <p:nvPr/>
+        </p:nvCxnSpPr>
+        <p:spPr>
+          <a:xfrm>
+            <a:off x="2252980" y="4681855"/>
+            <a:ext cx="0" cy="249555"/>
+          </a:xfrm>
+          <a:prstGeom prst="line">
+            <a:avLst/>
+          </a:prstGeom>
+        </p:spPr>
+        <p:style>
+          <a:lnRef idx="1">
+            <a:schemeClr val="accent1"/>
+          </a:lnRef>
+          <a:fillRef idx="0">
+            <a:schemeClr val="accent1"/>
+          </a:fillRef>
+          <a:effectRef idx="0">
+            <a:schemeClr val="accent1"/>
+          </a:effectRef>
+          <a:fontRef idx="minor">
+            <a:schemeClr val="tx1"/>
+          </a:fontRef>
+        </p:style>
+      </p:cxnSp>
+      <p:cxnSp>
+        <p:nvCxnSpPr>
+          <p:cNvPr id="8" name="Straight Connector 7"/>
+          <p:cNvCxnSpPr/>
+          <p:nvPr/>
+        </p:nvCxnSpPr>
+        <p:spPr>
+          <a:xfrm>
+            <a:off x="3089910" y="4676775"/>
+            <a:ext cx="0" cy="249555"/>
+          </a:xfrm>
+          <a:prstGeom prst="line">
+            <a:avLst/>
+          </a:prstGeom>
+        </p:spPr>
+        <p:style>
+          <a:lnRef idx="1">
+            <a:schemeClr val="accent1"/>
+          </a:lnRef>
+          <a:fillRef idx="0">
+            <a:schemeClr val="accent1"/>
+          </a:fillRef>
+          <a:effectRef idx="0">
+            <a:schemeClr val="accent1"/>
+          </a:effectRef>
+          <a:fontRef idx="minor">
+            <a:schemeClr val="tx1"/>
+          </a:fontRef>
+        </p:style>
+      </p:cxnSp>
+      <p:cxnSp>
+        <p:nvCxnSpPr>
+          <p:cNvPr id="6" name="Straight Connector 5"/>
+          <p:cNvCxnSpPr/>
+          <p:nvPr/>
+        </p:nvCxnSpPr>
+        <p:spPr>
+          <a:xfrm>
+            <a:off x="3926840" y="4671695"/>
+            <a:ext cx="0" cy="249555"/>
+          </a:xfrm>
+          <a:prstGeom prst="line">
+            <a:avLst/>
+          </a:prstGeom>
+        </p:spPr>
+        <p:style>
+          <a:lnRef idx="1">
+            <a:schemeClr val="accent1"/>
+          </a:lnRef>
+          <a:fillRef idx="0">
+            <a:schemeClr val="accent1"/>
+          </a:fillRef>
+          <a:effectRef idx="0">
+            <a:schemeClr val="accent1"/>
+          </a:effectRef>
+          <a:fontRef idx="minor">
+            <a:schemeClr val="tx1"/>
+          </a:fontRef>
+        </p:style>
+      </p:cxnSp>
+      <p:sp>
+        <p:nvSpPr>
+          <p:cNvPr id="10" name="Text Box 9"/>
+          <p:cNvSpPr txBox="1"/>
+          <p:nvPr/>
+        </p:nvSpPr>
+        <p:spPr>
+          <a:xfrm>
+            <a:off x="3913505" y="4886960"/>
+            <a:ext cx="483235" cy="365760"/>
+          </a:xfrm>
+          <a:prstGeom prst="rect">
+            <a:avLst/>
+          </a:prstGeom>
+          <a:noFill/>
+        </p:spPr>
+        <p:txBody>
+          <a:bodyPr wrap="square" rtlCol="0">
+            <a:spAutoFit/>
+          </a:bodyPr>
+          <a:p>
+            <a:r>
+              <a:rPr lang="x-none" altLang="en-US"/>
+              <a:t>4</a:t>
+            </a:r>
+            <a:endParaRPr lang="x-none" altLang="en-US"/>
+          </a:p>
+        </p:txBody>
+      </p:sp>
+      <p:sp>
+        <p:nvSpPr>
+          <p:cNvPr id="11" name="Text Box 10"/>
+          <p:cNvSpPr txBox="1"/>
+          <p:nvPr/>
+        </p:nvSpPr>
+        <p:spPr>
+          <a:xfrm>
+            <a:off x="3041015" y="4880610"/>
+            <a:ext cx="483235" cy="365760"/>
+          </a:xfrm>
+          <a:prstGeom prst="rect">
+            <a:avLst/>
+          </a:prstGeom>
+          <a:noFill/>
+        </p:spPr>
+        <p:txBody>
+          <a:bodyPr wrap="square" rtlCol="0">
+            <a:spAutoFit/>
+          </a:bodyPr>
+          <a:p>
+            <a:r>
+              <a:rPr lang="x-none" altLang="en-US"/>
+              <a:t>3</a:t>
+            </a:r>
+            <a:endParaRPr lang="x-none" altLang="en-US"/>
+          </a:p>
+        </p:txBody>
+      </p:sp>
+      <p:sp>
+        <p:nvSpPr>
+          <p:cNvPr id="12" name="Text Box 11"/>
+          <p:cNvSpPr txBox="1"/>
+          <p:nvPr/>
+        </p:nvSpPr>
+        <p:spPr>
+          <a:xfrm>
+            <a:off x="2250440" y="4892040"/>
+            <a:ext cx="483235" cy="365760"/>
+          </a:xfrm>
+          <a:prstGeom prst="rect">
+            <a:avLst/>
+          </a:prstGeom>
+          <a:noFill/>
+        </p:spPr>
+        <p:txBody>
+          <a:bodyPr wrap="square" rtlCol="0">
+            <a:spAutoFit/>
+          </a:bodyPr>
+          <a:p>
+            <a:r>
+              <a:rPr lang="x-none" altLang="en-US"/>
+              <a:t>2</a:t>
+            </a:r>
+            <a:endParaRPr lang="x-none" altLang="en-US"/>
+          </a:p>
+        </p:txBody>
+      </p:sp>
+      <p:sp>
+        <p:nvSpPr>
+          <p:cNvPr id="13" name="Text Box 12"/>
+          <p:cNvSpPr txBox="1"/>
+          <p:nvPr/>
+        </p:nvSpPr>
+        <p:spPr>
+          <a:xfrm>
+            <a:off x="1527175" y="4886325"/>
+            <a:ext cx="483235" cy="365760"/>
+          </a:xfrm>
+          <a:prstGeom prst="rect">
+            <a:avLst/>
+          </a:prstGeom>
+          <a:noFill/>
+        </p:spPr>
+        <p:txBody>
+          <a:bodyPr wrap="square" rtlCol="0">
+            <a:spAutoFit/>
+          </a:bodyPr>
+          <a:p>
+            <a:r>
+              <a:rPr lang="x-none" altLang="en-US"/>
+              <a:t>1</a:t>
+            </a:r>
+            <a:endParaRPr lang="x-none" altLang="en-US"/>
+          </a:p>
+        </p:txBody>
+      </p:sp>
+      <p:cxnSp>
+        <p:nvCxnSpPr>
+          <p:cNvPr id="14" name="Straight Connector 13"/>
+          <p:cNvCxnSpPr/>
+          <p:nvPr/>
+        </p:nvCxnSpPr>
+        <p:spPr>
+          <a:xfrm>
+            <a:off x="565150" y="5883275"/>
+            <a:ext cx="1665605" cy="0"/>
+          </a:xfrm>
+          <a:prstGeom prst="line">
+            <a:avLst/>
+          </a:prstGeom>
+          <a:ln w="38100">
+            <a:solidFill>
+              <a:srgbClr val="FF0000"/>
+            </a:solidFill>
+          </a:ln>
+        </p:spPr>
+        <p:style>
+          <a:lnRef idx="1">
+            <a:schemeClr val="accent1"/>
+          </a:lnRef>
+          <a:fillRef idx="0">
+            <a:schemeClr val="accent1"/>
+          </a:fillRef>
+          <a:effectRef idx="0">
+            <a:schemeClr val="accent1"/>
+          </a:effectRef>
+          <a:fontRef idx="minor">
+            <a:schemeClr val="tx1"/>
+          </a:fontRef>
+        </p:style>
+      </p:cxnSp>
+      <p:sp>
+        <p:nvSpPr>
+          <p:cNvPr id="18" name="Text Box 17"/>
+          <p:cNvSpPr txBox="1"/>
+          <p:nvPr/>
+        </p:nvSpPr>
+        <p:spPr>
+          <a:xfrm>
+            <a:off x="1365250" y="4153535"/>
+            <a:ext cx="383540" cy="579120"/>
+          </a:xfrm>
+          <a:prstGeom prst="rect">
+            <a:avLst/>
+          </a:prstGeom>
+          <a:noFill/>
+        </p:spPr>
+        <p:txBody>
+          <a:bodyPr wrap="square" rtlCol="0">
+            <a:spAutoFit/>
+            <a:scene3d>
+              <a:camera prst="orthographicFront"/>
+              <a:lightRig rig="threePt" dir="t"/>
+            </a:scene3d>
+          </a:bodyPr>
+          <a:p>
+            <a:r>
+              <a:rPr lang="x-none" altLang="en-US" sz="3200" b="1">
+                <a:ln w="10160">
+                  <a:solidFill>
+                    <a:schemeClr val="accent5"/>
+                  </a:solidFill>
+                  <a:prstDash val="solid"/>
+                </a:ln>
+                <a:solidFill>
+                  <a:srgbClr val="FFFFFF"/>
+                </a:solidFill>
+                <a:effectLst>
+                  <a:outerShdw blurRad="38100" dist="22860" dir="5400000" algn="tl" rotWithShape="0">
+                    <a:srgbClr val="000000">
+                      <a:alpha val="30000"/>
+                    </a:srgbClr>
+                  </a:outerShdw>
+                </a:effectLst>
+              </a:rPr>
+              <a:t>!</a:t>
+            </a:r>
+            <a:endParaRPr lang="x-none" altLang="en-US" sz="3200" b="1">
+              <a:ln w="10160">
+                <a:solidFill>
+                  <a:schemeClr val="accent5"/>
+                </a:solidFill>
+                <a:prstDash val="solid"/>
+              </a:ln>
+              <a:solidFill>
+                <a:srgbClr val="FFFFFF"/>
+              </a:solidFill>
+              <a:effectLst>
+                <a:outerShdw blurRad="38100" dist="22860" dir="5400000" algn="tl" rotWithShape="0">
+                  <a:srgbClr val="000000">
+                    <a:alpha val="30000"/>
+                  </a:srgbClr>
+                </a:outerShdw>
+              </a:effectLst>
+            </a:endParaRPr>
+          </a:p>
+        </p:txBody>
+      </p:sp>
+      <p:cxnSp>
+        <p:nvCxnSpPr>
+          <p:cNvPr id="19" name="Straight Connector 18"/>
+          <p:cNvCxnSpPr/>
+          <p:nvPr/>
+        </p:nvCxnSpPr>
+        <p:spPr>
+          <a:xfrm>
+            <a:off x="2230755" y="4370070"/>
+            <a:ext cx="0" cy="1532255"/>
+          </a:xfrm>
+          <a:prstGeom prst="line">
+            <a:avLst/>
+          </a:prstGeom>
+        </p:spPr>
+        <p:style>
+          <a:lnRef idx="1">
+            <a:schemeClr val="dk1"/>
+          </a:lnRef>
+          <a:fillRef idx="0">
+            <a:schemeClr val="dk1"/>
+          </a:fillRef>
+          <a:effectRef idx="0">
+            <a:schemeClr val="dk1"/>
+          </a:effectRef>
+          <a:fontRef idx="minor">
+            <a:schemeClr val="tx1"/>
+          </a:fontRef>
+        </p:style>
+      </p:cxnSp>
+      <p:cxnSp>
+        <p:nvCxnSpPr>
+          <p:cNvPr id="21" name="Straight Connector 20"/>
+          <p:cNvCxnSpPr/>
+          <p:nvPr/>
+        </p:nvCxnSpPr>
+        <p:spPr>
+          <a:xfrm>
+            <a:off x="6922135" y="4763135"/>
+            <a:ext cx="4113530" cy="0"/>
+          </a:xfrm>
+          <a:prstGeom prst="line">
+            <a:avLst/>
+          </a:prstGeom>
+        </p:spPr>
+        <p:style>
+          <a:lnRef idx="1">
+            <a:schemeClr val="accent1"/>
+          </a:lnRef>
+          <a:fillRef idx="0">
+            <a:schemeClr val="accent1"/>
+          </a:fillRef>
+          <a:effectRef idx="0">
+            <a:schemeClr val="accent1"/>
+          </a:effectRef>
+          <a:fontRef idx="minor">
+            <a:schemeClr val="tx1"/>
+          </a:fontRef>
+        </p:style>
+      </p:cxnSp>
+      <p:cxnSp>
+        <p:nvCxnSpPr>
+          <p:cNvPr id="22" name="Straight Connector 21"/>
+          <p:cNvCxnSpPr/>
+          <p:nvPr/>
+        </p:nvCxnSpPr>
+        <p:spPr>
+          <a:xfrm>
+            <a:off x="7638415" y="4663440"/>
+            <a:ext cx="0" cy="249555"/>
+          </a:xfrm>
+          <a:prstGeom prst="line">
+            <a:avLst/>
+          </a:prstGeom>
+        </p:spPr>
+        <p:style>
+          <a:lnRef idx="1">
+            <a:schemeClr val="accent1"/>
+          </a:lnRef>
+          <a:fillRef idx="0">
+            <a:schemeClr val="accent1"/>
+          </a:fillRef>
+          <a:effectRef idx="0">
+            <a:schemeClr val="accent1"/>
+          </a:effectRef>
+          <a:fontRef idx="minor">
+            <a:schemeClr val="tx1"/>
+          </a:fontRef>
+        </p:style>
+      </p:cxnSp>
+      <p:cxnSp>
+        <p:nvCxnSpPr>
+          <p:cNvPr id="23" name="Straight Connector 22"/>
+          <p:cNvCxnSpPr/>
+          <p:nvPr/>
+        </p:nvCxnSpPr>
+        <p:spPr>
+          <a:xfrm>
+            <a:off x="8376285" y="4658360"/>
+            <a:ext cx="0" cy="249555"/>
+          </a:xfrm>
+          <a:prstGeom prst="line">
+            <a:avLst/>
+          </a:prstGeom>
+        </p:spPr>
+        <p:style>
+          <a:lnRef idx="1">
+            <a:schemeClr val="accent1"/>
+          </a:lnRef>
+          <a:fillRef idx="0">
+            <a:schemeClr val="accent1"/>
+          </a:fillRef>
+          <a:effectRef idx="0">
+            <a:schemeClr val="accent1"/>
+          </a:effectRef>
+          <a:fontRef idx="minor">
+            <a:schemeClr val="tx1"/>
+          </a:fontRef>
+        </p:style>
+      </p:cxnSp>
+      <p:cxnSp>
+        <p:nvCxnSpPr>
+          <p:cNvPr id="24" name="Straight Connector 23"/>
+          <p:cNvCxnSpPr/>
+          <p:nvPr/>
+        </p:nvCxnSpPr>
+        <p:spPr>
+          <a:xfrm>
+            <a:off x="9213215" y="4653280"/>
+            <a:ext cx="0" cy="249555"/>
+          </a:xfrm>
+          <a:prstGeom prst="line">
+            <a:avLst/>
+          </a:prstGeom>
+        </p:spPr>
+        <p:style>
+          <a:lnRef idx="1">
+            <a:schemeClr val="accent1"/>
+          </a:lnRef>
+          <a:fillRef idx="0">
+            <a:schemeClr val="accent1"/>
+          </a:fillRef>
+          <a:effectRef idx="0">
+            <a:schemeClr val="accent1"/>
+          </a:effectRef>
+          <a:fontRef idx="minor">
+            <a:schemeClr val="tx1"/>
+          </a:fontRef>
+        </p:style>
+      </p:cxnSp>
+      <p:cxnSp>
+        <p:nvCxnSpPr>
+          <p:cNvPr id="25" name="Straight Connector 24"/>
+          <p:cNvCxnSpPr/>
+          <p:nvPr/>
+        </p:nvCxnSpPr>
+        <p:spPr>
+          <a:xfrm>
+            <a:off x="10050145" y="4648200"/>
+            <a:ext cx="0" cy="249555"/>
+          </a:xfrm>
+          <a:prstGeom prst="line">
+            <a:avLst/>
+          </a:prstGeom>
+        </p:spPr>
+        <p:style>
+          <a:lnRef idx="1">
+            <a:schemeClr val="accent1"/>
+          </a:lnRef>
+          <a:fillRef idx="0">
+            <a:schemeClr val="accent1"/>
+          </a:fillRef>
+          <a:effectRef idx="0">
+            <a:schemeClr val="accent1"/>
+          </a:effectRef>
+          <a:fontRef idx="minor">
+            <a:schemeClr val="tx1"/>
+          </a:fontRef>
+        </p:style>
+      </p:cxnSp>
+      <p:sp>
+        <p:nvSpPr>
+          <p:cNvPr id="26" name="Text Box 25"/>
+          <p:cNvSpPr txBox="1"/>
+          <p:nvPr/>
+        </p:nvSpPr>
+        <p:spPr>
+          <a:xfrm>
+            <a:off x="10036810" y="4863465"/>
+            <a:ext cx="483235" cy="365760"/>
+          </a:xfrm>
+          <a:prstGeom prst="rect">
+            <a:avLst/>
+          </a:prstGeom>
+          <a:noFill/>
+        </p:spPr>
+        <p:txBody>
+          <a:bodyPr wrap="square" rtlCol="0">
+            <a:spAutoFit/>
+          </a:bodyPr>
+          <a:p>
+            <a:r>
+              <a:rPr lang="x-none" altLang="en-US"/>
+              <a:t>4</a:t>
+            </a:r>
+            <a:endParaRPr lang="x-none" altLang="en-US"/>
+          </a:p>
+        </p:txBody>
+      </p:sp>
+      <p:sp>
+        <p:nvSpPr>
+          <p:cNvPr id="27" name="Text Box 26"/>
+          <p:cNvSpPr txBox="1"/>
+          <p:nvPr/>
+        </p:nvSpPr>
+        <p:spPr>
+          <a:xfrm>
+            <a:off x="9164320" y="4857115"/>
+            <a:ext cx="483235" cy="365760"/>
+          </a:xfrm>
+          <a:prstGeom prst="rect">
+            <a:avLst/>
+          </a:prstGeom>
+          <a:noFill/>
+        </p:spPr>
+        <p:txBody>
+          <a:bodyPr wrap="square" rtlCol="0">
+            <a:spAutoFit/>
+          </a:bodyPr>
+          <a:p>
+            <a:r>
+              <a:rPr lang="x-none" altLang="en-US"/>
+              <a:t>3</a:t>
+            </a:r>
+            <a:endParaRPr lang="x-none" altLang="en-US"/>
+          </a:p>
+        </p:txBody>
+      </p:sp>
+      <p:sp>
+        <p:nvSpPr>
+          <p:cNvPr id="28" name="Text Box 27"/>
+          <p:cNvSpPr txBox="1"/>
+          <p:nvPr/>
+        </p:nvSpPr>
+        <p:spPr>
+          <a:xfrm>
+            <a:off x="8373745" y="4868545"/>
+            <a:ext cx="483235" cy="365760"/>
+          </a:xfrm>
+          <a:prstGeom prst="rect">
+            <a:avLst/>
+          </a:prstGeom>
+          <a:noFill/>
+        </p:spPr>
+        <p:txBody>
+          <a:bodyPr wrap="square" rtlCol="0">
+            <a:spAutoFit/>
+          </a:bodyPr>
+          <a:p>
+            <a:r>
+              <a:rPr lang="x-none" altLang="en-US"/>
+              <a:t>2</a:t>
+            </a:r>
+            <a:endParaRPr lang="x-none" altLang="en-US"/>
+          </a:p>
+        </p:txBody>
+      </p:sp>
+      <p:sp>
+        <p:nvSpPr>
+          <p:cNvPr id="29" name="Text Box 28"/>
+          <p:cNvSpPr txBox="1"/>
+          <p:nvPr/>
+        </p:nvSpPr>
+        <p:spPr>
+          <a:xfrm>
+            <a:off x="7650480" y="4862830"/>
+            <a:ext cx="483235" cy="365760"/>
+          </a:xfrm>
+          <a:prstGeom prst="rect">
+            <a:avLst/>
+          </a:prstGeom>
+          <a:noFill/>
+        </p:spPr>
+        <p:txBody>
+          <a:bodyPr wrap="square" rtlCol="0">
+            <a:spAutoFit/>
+          </a:bodyPr>
+          <a:p>
+            <a:r>
+              <a:rPr lang="x-none" altLang="en-US"/>
+              <a:t>1</a:t>
+            </a:r>
+            <a:endParaRPr lang="x-none" altLang="en-US"/>
+          </a:p>
+        </p:txBody>
+      </p:sp>
+      <p:cxnSp>
+        <p:nvCxnSpPr>
+          <p:cNvPr id="30" name="Straight Connector 29"/>
+          <p:cNvCxnSpPr/>
+          <p:nvPr/>
+        </p:nvCxnSpPr>
+        <p:spPr>
+          <a:xfrm>
+            <a:off x="6671945" y="5859780"/>
+            <a:ext cx="3387725" cy="0"/>
+          </a:xfrm>
+          <a:prstGeom prst="line">
+            <a:avLst/>
+          </a:prstGeom>
+          <a:ln w="38100">
+            <a:solidFill>
+              <a:srgbClr val="FF0000"/>
+            </a:solidFill>
+          </a:ln>
+        </p:spPr>
+        <p:style>
+          <a:lnRef idx="1">
+            <a:schemeClr val="accent1"/>
+          </a:lnRef>
+          <a:fillRef idx="0">
+            <a:schemeClr val="accent1"/>
+          </a:fillRef>
+          <a:effectRef idx="0">
+            <a:schemeClr val="accent1"/>
+          </a:effectRef>
+          <a:fontRef idx="minor">
+            <a:schemeClr val="tx1"/>
+          </a:fontRef>
+        </p:style>
+      </p:cxnSp>
+      <p:cxnSp>
+        <p:nvCxnSpPr>
+          <p:cNvPr id="31" name="Straight Connector 30"/>
+          <p:cNvCxnSpPr/>
+          <p:nvPr/>
+        </p:nvCxnSpPr>
+        <p:spPr>
+          <a:xfrm>
+            <a:off x="8394700" y="4163695"/>
+            <a:ext cx="1659255" cy="0"/>
+          </a:xfrm>
+          <a:prstGeom prst="line">
+            <a:avLst/>
+          </a:prstGeom>
+          <a:ln w="38100">
+            <a:solidFill>
+              <a:srgbClr val="00B050"/>
+            </a:solidFill>
+          </a:ln>
+        </p:spPr>
+        <p:style>
+          <a:lnRef idx="1">
+            <a:schemeClr val="accent1"/>
+          </a:lnRef>
+          <a:fillRef idx="0">
+            <a:schemeClr val="accent1"/>
+          </a:fillRef>
+          <a:effectRef idx="0">
+            <a:schemeClr val="accent1"/>
+          </a:effectRef>
+          <a:fontRef idx="minor">
+            <a:schemeClr val="tx1"/>
+          </a:fontRef>
+        </p:style>
+      </p:cxnSp>
+      <p:sp>
+        <p:nvSpPr>
+          <p:cNvPr id="32" name="Text Box 31"/>
+          <p:cNvSpPr txBox="1"/>
+          <p:nvPr/>
+        </p:nvSpPr>
+        <p:spPr>
+          <a:xfrm>
+            <a:off x="7488555" y="4130040"/>
+            <a:ext cx="383540" cy="579120"/>
+          </a:xfrm>
+          <a:prstGeom prst="rect">
+            <a:avLst/>
+          </a:prstGeom>
+          <a:noFill/>
+        </p:spPr>
+        <p:txBody>
+          <a:bodyPr wrap="square" rtlCol="0">
+            <a:spAutoFit/>
+            <a:scene3d>
+              <a:camera prst="orthographicFront"/>
+              <a:lightRig rig="threePt" dir="t"/>
+            </a:scene3d>
+          </a:bodyPr>
+          <a:p>
+            <a:r>
+              <a:rPr lang="x-none" altLang="en-US" sz="3200" b="1">
+                <a:ln w="10160">
+                  <a:solidFill>
+                    <a:schemeClr val="accent5"/>
+                  </a:solidFill>
+                  <a:prstDash val="solid"/>
+                </a:ln>
+                <a:solidFill>
+                  <a:srgbClr val="FFFFFF"/>
+                </a:solidFill>
+                <a:effectLst>
+                  <a:outerShdw blurRad="38100" dist="22860" dir="5400000" algn="tl" rotWithShape="0">
+                    <a:srgbClr val="000000">
+                      <a:alpha val="30000"/>
+                    </a:srgbClr>
+                  </a:outerShdw>
+                </a:effectLst>
+              </a:rPr>
+              <a:t>!</a:t>
+            </a:r>
+            <a:endParaRPr lang="x-none" altLang="en-US" sz="3200" b="1">
+              <a:ln w="10160">
+                <a:solidFill>
+                  <a:schemeClr val="accent5"/>
+                </a:solidFill>
+                <a:prstDash val="solid"/>
+              </a:ln>
+              <a:solidFill>
+                <a:srgbClr val="FFFFFF"/>
+              </a:solidFill>
+              <a:effectLst>
+                <a:outerShdw blurRad="38100" dist="22860" dir="5400000" algn="tl" rotWithShape="0">
+                  <a:srgbClr val="000000">
+                    <a:alpha val="30000"/>
+                  </a:srgbClr>
+                </a:outerShdw>
+              </a:effectLst>
+            </a:endParaRPr>
+          </a:p>
+        </p:txBody>
+      </p:sp>
+      <p:cxnSp>
+        <p:nvCxnSpPr>
+          <p:cNvPr id="33" name="Straight Connector 32"/>
+          <p:cNvCxnSpPr/>
+          <p:nvPr/>
+        </p:nvCxnSpPr>
+        <p:spPr>
+          <a:xfrm>
+            <a:off x="10052685" y="4171950"/>
+            <a:ext cx="0" cy="1689735"/>
+          </a:xfrm>
+          <a:prstGeom prst="line">
+            <a:avLst/>
+          </a:prstGeom>
+        </p:spPr>
+        <p:style>
+          <a:lnRef idx="1">
+            <a:schemeClr val="dk1"/>
+          </a:lnRef>
+          <a:fillRef idx="0">
+            <a:schemeClr val="dk1"/>
+          </a:fillRef>
+          <a:effectRef idx="0">
+            <a:schemeClr val="dk1"/>
+          </a:effectRef>
+          <a:fontRef idx="minor">
+            <a:schemeClr val="tx1"/>
+          </a:fontRef>
+        </p:style>
+      </p:cxnSp>
+      <p:cxnSp>
+        <p:nvCxnSpPr>
+          <p:cNvPr id="34" name="Straight Connector 33"/>
+          <p:cNvCxnSpPr/>
+          <p:nvPr/>
+        </p:nvCxnSpPr>
+        <p:spPr>
+          <a:xfrm>
+            <a:off x="8396605" y="4138295"/>
+            <a:ext cx="0" cy="1299210"/>
+          </a:xfrm>
+          <a:prstGeom prst="line">
+            <a:avLst/>
+          </a:prstGeom>
+        </p:spPr>
+        <p:style>
+          <a:lnRef idx="1">
+            <a:schemeClr val="dk1"/>
+          </a:lnRef>
+          <a:fillRef idx="0">
+            <a:schemeClr val="dk1"/>
+          </a:fillRef>
+          <a:effectRef idx="0">
+            <a:schemeClr val="dk1"/>
+          </a:effectRef>
+          <a:fontRef idx="minor">
+            <a:schemeClr val="tx1"/>
+          </a:fontRef>
+        </p:style>
+      </p:cxnSp>
+      <p:sp>
+        <p:nvSpPr>
+          <p:cNvPr id="35" name="Text Box 34"/>
+          <p:cNvSpPr txBox="1"/>
+          <p:nvPr/>
+        </p:nvSpPr>
+        <p:spPr>
+          <a:xfrm>
+            <a:off x="9030970" y="4173855"/>
+            <a:ext cx="383540" cy="579120"/>
+          </a:xfrm>
+          <a:prstGeom prst="rect">
+            <a:avLst/>
+          </a:prstGeom>
+          <a:noFill/>
+        </p:spPr>
+        <p:txBody>
+          <a:bodyPr wrap="square" rtlCol="0">
+            <a:spAutoFit/>
+            <a:scene3d>
+              <a:camera prst="orthographicFront"/>
+              <a:lightRig rig="threePt" dir="t"/>
+            </a:scene3d>
+          </a:bodyPr>
+          <a:p>
+            <a:r>
+              <a:rPr lang="x-none" altLang="en-US" sz="3200" b="1">
+                <a:ln w="10160">
+                  <a:solidFill>
+                    <a:schemeClr val="accent5"/>
+                  </a:solidFill>
+                  <a:prstDash val="solid"/>
+                </a:ln>
+                <a:solidFill>
+                  <a:srgbClr val="FFFFFF"/>
+                </a:solidFill>
+                <a:effectLst>
+                  <a:outerShdw blurRad="38100" dist="22860" dir="5400000" algn="tl" rotWithShape="0">
+                    <a:srgbClr val="000000">
+                      <a:alpha val="30000"/>
+                    </a:srgbClr>
+                  </a:outerShdw>
+                </a:effectLst>
+              </a:rPr>
+              <a:t>!</a:t>
+            </a:r>
+            <a:endParaRPr lang="x-none" altLang="en-US" sz="3200" b="1">
+              <a:ln w="10160">
+                <a:solidFill>
+                  <a:schemeClr val="accent5"/>
+                </a:solidFill>
+                <a:prstDash val="solid"/>
+              </a:ln>
+              <a:solidFill>
+                <a:srgbClr val="FFFFFF"/>
+              </a:solidFill>
+              <a:effectLst>
+                <a:outerShdw blurRad="38100" dist="22860" dir="5400000" algn="tl" rotWithShape="0">
+                  <a:srgbClr val="000000">
+                    <a:alpha val="30000"/>
+                  </a:srgbClr>
+                </a:outerShdw>
+              </a:effectLst>
+            </a:endParaRPr>
+          </a:p>
+        </p:txBody>
+      </p:sp>
     </p:spTree>
   </p:cSld>
   <p:clrMapOvr>
@@ -4751,7 +5821,7 @@
           <a:p>
             <a:r>
               <a:rPr lang="x-none" altLang="en-US" sz="3600"/>
-              <a:t>Решение второй задачи</a:t>
+              <a:t>Решение второй задачи (1-ый алгоритм)</a:t>
             </a:r>
             <a:endParaRPr lang="x-none" altLang="en-US" sz="3600"/>
           </a:p>
@@ -4766,7 +5836,7 @@
         <p:spPr>
           <a:xfrm>
             <a:off x="266065" y="805180"/>
-            <a:ext cx="11425555" cy="5852160"/>
+            <a:ext cx="11425555" cy="5303520"/>
           </a:xfrm>
           <a:prstGeom prst="rect">
             <a:avLst/>
@@ -4805,9 +5875,6 @@
             <a:endParaRPr lang="x-none" altLang="en-US"/>
           </a:p>
           <a:p>
-            <a:endParaRPr lang="x-none" altLang="en-US"/>
-          </a:p>
-          <a:p>
             <a:r>
               <a:rPr lang="x-none" altLang="en-US"/>
               <a:t>2) Как только данное соотношение будет нарушено необходимо остановиться и отметить текущее число (позиция 1).</a:t>
@@ -4815,9 +5882,6 @@
             <a:endParaRPr lang="x-none" altLang="en-US"/>
           </a:p>
           <a:p>
-            <a:endParaRPr lang="x-none" altLang="en-US"/>
-          </a:p>
-          <a:p>
             <a:r>
               <a:rPr lang="x-none" altLang="en-US"/>
               <a:t>3) Снова просмотреть пройденный путь справа налево пока не дойдем до первого числа, которое больше чем отмеченное на предыдущем шаге.</a:t>
@@ -4825,9 +5889,6 @@
             <a:endParaRPr lang="x-none" altLang="en-US"/>
           </a:p>
           <a:p>
-            <a:endParaRPr lang="x-none" altLang="en-US"/>
-          </a:p>
-          <a:p>
             <a:r>
               <a:rPr lang="x-none" altLang="en-US"/>
               <a:t>4) Поменять местами два полученных элемента.</a:t>
@@ -4835,12 +5896,19 @@
             <a:endParaRPr lang="x-none" altLang="en-US"/>
           </a:p>
           <a:p>
-            <a:endParaRPr lang="x-none" altLang="en-US"/>
-          </a:p>
-          <a:p>
             <a:r>
               <a:rPr lang="x-none" altLang="en-US"/>
               <a:t>5) Теперь в части массива, которая размещена справа от позиции 1 надо отсортировать все числа в порядке возрастания. Поскольку до этого они все были уже записаны в порядке убывания необходимо эту часть подпоследовательность просто перевернуть.</a:t>
+            </a:r>
+            <a:endParaRPr lang="x-none" altLang="en-US"/>
+          </a:p>
+          <a:p>
+            <a:endParaRPr lang="x-none" altLang="en-US"/>
+          </a:p>
+          <a:p>
+            <a:r>
+              <a:rPr lang="x-none" altLang="en-US"/>
+              <a:t>Сгенерировав новую перестановку, проверяем ее алгоритмом проверки описанным выше.</a:t>
             </a:r>
             <a:endParaRPr lang="x-none" altLang="en-US"/>
           </a:p>
@@ -4885,7 +5953,7 @@
           <a:p>
             <a:r>
               <a:rPr lang="x-none" altLang="en-US" sz="3600"/>
-              <a:t>Решение второй задачи</a:t>
+              <a:t>Решение второй задачи (2-ой алгоритм)</a:t>
             </a:r>
             <a:endParaRPr lang="x-none" altLang="en-US" sz="3600"/>
           </a:p>
@@ -4914,14 +5982,14 @@
           <a:p>
             <a:r>
               <a:rPr lang="x-none" altLang="en-US" sz="2000"/>
-              <a:t>Сложность данного алгоритма O(n!). </a:t>
+              <a:t>Сложность 1-го алгоритма O(n!). </a:t>
             </a:r>
             <a:endParaRPr lang="x-none" altLang="en-US" sz="2000"/>
           </a:p>
           <a:p>
             <a:r>
               <a:rPr lang="x-none" altLang="en-US" sz="2000"/>
-              <a:t>Чтобы немного ускорить его я разделил перестановку на 2 массива четных и нечетных чисел.</a:t>
+              <a:t>Чтобы ускорить его я разделил перестановку на 2 массива четных и нечетных чисел.</a:t>
             </a:r>
             <a:endParaRPr lang="x-none" altLang="en-US" sz="2000"/>
           </a:p>
@@ -5430,8 +6498,8 @@
         </p:nvSpPr>
         <p:spPr>
           <a:xfrm>
-            <a:off x="260350" y="4912995"/>
-            <a:ext cx="11425555" cy="1584960"/>
+            <a:off x="377190" y="4879975"/>
+            <a:ext cx="11425555" cy="1310640"/>
           </a:xfrm>
           <a:prstGeom prst="rect">
             <a:avLst/>
@@ -5459,12 +6527,9 @@
           <a:p>
             <a:r>
               <a:rPr lang="x-none" altLang="en-US" sz="2000"/>
-              <a:t>Данный алгоритм будет генерировать сразу перестановки с чередующейся четностью элементов.</a:t>
+              <a:t>Данный алгоритм будет генерировать сразу перестановки с чередующейся четностью элементов. </a:t>
             </a:r>
             <a:endParaRPr lang="x-none" altLang="en-US" sz="2000"/>
-          </a:p>
-          <a:p>
-            <a:endParaRPr lang="x-none" altLang="en-US"/>
           </a:p>
         </p:txBody>
       </p:sp>
@@ -5496,13 +6561,18 @@
             <p:ph type="title"/>
           </p:nvPr>
         </p:nvSpPr>
-        <p:spPr/>
+        <p:spPr>
+          <a:xfrm>
+            <a:off x="593090" y="7938"/>
+            <a:ext cx="10972800" cy="1143000"/>
+          </a:xfrm>
+        </p:spPr>
         <p:txBody>
           <a:bodyPr/>
           <a:p>
             <a:r>
               <a:rPr lang="x-none" altLang="en-US" sz="3600"/>
-              <a:t>Используемые технологии</a:t>
+              <a:t>Сравнительные результаты алгоритмов</a:t>
             </a:r>
             <a:endParaRPr lang="x-none" altLang="en-US" sz="3600"/>
           </a:p>
@@ -5510,75 +6580,616 @@
       </p:sp>
       <p:sp>
         <p:nvSpPr>
-          <p:cNvPr id="3" name="Content Placeholder 2"/>
-          <p:cNvSpPr>
-            <a:spLocks noGrp="1"/>
-          </p:cNvSpPr>
-          <p:nvPr>
-            <p:ph idx="1"/>
-          </p:nvPr>
-        </p:nvSpPr>
-        <p:spPr/>
-        <p:txBody>
-          <a:bodyPr/>
-          <a:p>
-            <a:pPr marL="0" indent="0">
-              <a:buNone/>
-            </a:pPr>
-            <a:r>
-              <a:rPr lang="x-none" altLang="en-US"/>
-              <a:t>В качестве основного языка программирования выбран Java. </a:t>
-            </a:r>
-            <a:endParaRPr lang="x-none" altLang="en-US"/>
-          </a:p>
-          <a:p>
-            <a:pPr marL="0" indent="0">
-              <a:buNone/>
-            </a:pPr>
-            <a:r>
-              <a:rPr lang="x-none" altLang="en-US"/>
-              <a:t>Выбор был сделан опираясь на главное преимущество этого языка - мультиплатформенность.</a:t>
-            </a:r>
-            <a:endParaRPr lang="x-none" altLang="en-US"/>
-          </a:p>
-          <a:p>
-            <a:pPr marL="0" indent="0">
-              <a:buNone/>
-            </a:pPr>
-            <a:endParaRPr lang="x-none" altLang="en-US"/>
-          </a:p>
-          <a:p>
-            <a:pPr marL="0" indent="0">
-              <a:buNone/>
-            </a:pPr>
-            <a:endParaRPr lang="x-none" altLang="en-US"/>
-          </a:p>
-        </p:txBody>
-      </p:sp>
-      <p:pic>
-        <p:nvPicPr>
-          <p:cNvPr id="5" name="Picture 4"/>
-          <p:cNvPicPr>
-            <a:picLocks noChangeAspect="1"/>
-          </p:cNvPicPr>
+          <p:cNvPr id="6" name="Text Box 5"/>
+          <p:cNvSpPr txBox="1"/>
           <p:nvPr/>
-        </p:nvPicPr>
-        <p:blipFill>
-          <a:blip r:embed="rId1"/>
-          <a:stretch>
-            <a:fillRect/>
-          </a:stretch>
-        </p:blipFill>
-        <p:spPr>
-          <a:xfrm>
-            <a:off x="7709535" y="2826385"/>
-            <a:ext cx="3934460" cy="3934460"/>
+        </p:nvSpPr>
+        <p:spPr>
+          <a:xfrm>
+            <a:off x="365760" y="904240"/>
+            <a:ext cx="11425555" cy="1310640"/>
           </a:xfrm>
           <a:prstGeom prst="rect">
             <a:avLst/>
           </a:prstGeom>
-        </p:spPr>
-      </p:pic>
+          <a:noFill/>
+        </p:spPr>
+        <p:txBody>
+          <a:bodyPr wrap="square" rtlCol="0">
+            <a:spAutoFit/>
+          </a:bodyPr>
+          <a:p>
+            <a:r>
+              <a:rPr lang="x-none" altLang="en-US" sz="2000"/>
+              <a:t>Оба алгоритма генерируют меандры для любого N. Но из-за сложности перебора может быть затрачено большое кол-во времени. Приведу стравнительную таблицу скорости нахождения всех меандров до от 6 до 15 (для меньших нет смысла проверять). Сами результаты генераций можно найти в репозитории.</a:t>
+            </a:r>
+            <a:endParaRPr lang="x-none" altLang="en-US"/>
+          </a:p>
+        </p:txBody>
+      </p:sp>
+      <p:graphicFrame>
+        <p:nvGraphicFramePr>
+          <p:cNvPr id="4" name="Table 3"/>
+          <p:cNvGraphicFramePr/>
+          <p:nvPr/>
+        </p:nvGraphicFramePr>
+        <p:xfrm>
+          <a:off x="1361440" y="2457450"/>
+          <a:ext cx="9483725" cy="4191000"/>
+        </p:xfrm>
+        <a:graphic>
+          <a:graphicData uri="http://schemas.openxmlformats.org/drawingml/2006/table">
+            <a:tbl>
+              <a:tblPr firstRow="1" bandRow="1">
+                <a:tableStyleId>{5C22544A-7EE6-4342-B048-85BDC9FD1C3A}</a:tableStyleId>
+              </a:tblPr>
+              <a:tblGrid>
+                <a:gridCol w="680720"/>
+                <a:gridCol w="4458970"/>
+                <a:gridCol w="4344035"/>
+              </a:tblGrid>
+              <a:tr h="381000">
+                <a:tc>
+                  <a:txBody>
+                    <a:bodyPr/>
+                    <a:p>
+                      <a:pPr algn="ctr">
+                        <a:buNone/>
+                      </a:pPr>
+                      <a:r>
+                        <a:rPr lang="x-none"/>
+                        <a:t>N</a:t>
+                      </a:r>
+                      <a:endParaRPr lang="x-none"/>
+                    </a:p>
+                  </a:txBody>
+                  <a:tcPr/>
+                </a:tc>
+                <a:tc>
+                  <a:txBody>
+                    <a:bodyPr/>
+                    <a:p>
+                      <a:pPr algn="ctr">
+                        <a:buNone/>
+                      </a:pPr>
+                      <a:r>
+                        <a:rPr lang="x-none"/>
+                        <a:t>Алгоритм 1, миллисекунды</a:t>
+                      </a:r>
+                      <a:endParaRPr lang="x-none"/>
+                    </a:p>
+                  </a:txBody>
+                  <a:tcPr/>
+                </a:tc>
+                <a:tc>
+                  <a:txBody>
+                    <a:bodyPr/>
+                    <a:p>
+                      <a:pPr algn="ctr">
+                        <a:buNone/>
+                      </a:pPr>
+                      <a:r>
+                        <a:rPr lang="x-none"/>
+                        <a:t>Алгоритм 2, </a:t>
+                      </a:r>
+                      <a:r>
+                        <a:rPr lang="x-none" sz="1800">
+                          <a:sym typeface="+mn-ea"/>
+                        </a:rPr>
+                        <a:t>миллисекунды</a:t>
+                      </a:r>
+                      <a:endParaRPr lang="x-none"/>
+                    </a:p>
+                  </a:txBody>
+                  <a:tcPr/>
+                </a:tc>
+              </a:tr>
+              <a:tr h="381000">
+                <a:tc>
+                  <a:txBody>
+                    <a:bodyPr/>
+                    <a:p>
+                      <a:pPr algn="ctr">
+                        <a:buNone/>
+                      </a:pPr>
+                      <a:r>
+                        <a:rPr lang="x-none"/>
+                        <a:t>6</a:t>
+                      </a:r>
+                      <a:endParaRPr lang="x-none"/>
+                    </a:p>
+                  </a:txBody>
+                  <a:tcPr/>
+                </a:tc>
+                <a:tc>
+                  <a:txBody>
+                    <a:bodyPr/>
+                    <a:p>
+                      <a:pPr algn="ctr">
+                        <a:buNone/>
+                      </a:pPr>
+                      <a:r>
+                        <a:rPr lang="x-none"/>
+                        <a:t>3</a:t>
+                      </a:r>
+                      <a:endParaRPr lang="x-none"/>
+                    </a:p>
+                  </a:txBody>
+                  <a:tcPr/>
+                </a:tc>
+                <a:tc>
+                  <a:txBody>
+                    <a:bodyPr/>
+                    <a:p>
+                      <a:pPr algn="ctr">
+                        <a:buNone/>
+                      </a:pPr>
+                      <a:r>
+                        <a:rPr lang="x-none"/>
+                        <a:t>3</a:t>
+                      </a:r>
+                      <a:endParaRPr lang="x-none"/>
+                    </a:p>
+                  </a:txBody>
+                  <a:tcPr/>
+                </a:tc>
+              </a:tr>
+              <a:tr h="381000">
+                <a:tc>
+                  <a:txBody>
+                    <a:bodyPr/>
+                    <a:p>
+                      <a:pPr algn="ctr">
+                        <a:buNone/>
+                      </a:pPr>
+                      <a:r>
+                        <a:rPr lang="x-none"/>
+                        <a:t>7</a:t>
+                      </a:r>
+                      <a:endParaRPr lang="x-none"/>
+                    </a:p>
+                  </a:txBody>
+                  <a:tcPr/>
+                </a:tc>
+                <a:tc>
+                  <a:txBody>
+                    <a:bodyPr/>
+                    <a:p>
+                      <a:pPr algn="ctr">
+                        <a:buNone/>
+                      </a:pPr>
+                      <a:r>
+                        <a:rPr lang="x-none"/>
+                        <a:t>5</a:t>
+                      </a:r>
+                      <a:endParaRPr lang="x-none"/>
+                    </a:p>
+                  </a:txBody>
+                  <a:tcPr/>
+                </a:tc>
+                <a:tc>
+                  <a:txBody>
+                    <a:bodyPr/>
+                    <a:p>
+                      <a:pPr algn="ctr">
+                        <a:buNone/>
+                      </a:pPr>
+                      <a:r>
+                        <a:rPr lang="x-none"/>
+                        <a:t>6</a:t>
+                      </a:r>
+                      <a:endParaRPr lang="x-none"/>
+                    </a:p>
+                  </a:txBody>
+                  <a:tcPr/>
+                </a:tc>
+              </a:tr>
+              <a:tr h="381000">
+                <a:tc>
+                  <a:txBody>
+                    <a:bodyPr/>
+                    <a:p>
+                      <a:pPr algn="ctr">
+                        <a:buNone/>
+                      </a:pPr>
+                      <a:r>
+                        <a:rPr lang="x-none"/>
+                        <a:t>8</a:t>
+                      </a:r>
+                      <a:endParaRPr lang="x-none"/>
+                    </a:p>
+                  </a:txBody>
+                  <a:tcPr/>
+                </a:tc>
+                <a:tc>
+                  <a:txBody>
+                    <a:bodyPr/>
+                    <a:p>
+                      <a:pPr algn="ctr">
+                        <a:buNone/>
+                      </a:pPr>
+                      <a:r>
+                        <a:rPr lang="x-none"/>
+                        <a:t>8</a:t>
+                      </a:r>
+                      <a:endParaRPr lang="x-none"/>
+                    </a:p>
+                  </a:txBody>
+                  <a:tcPr/>
+                </a:tc>
+                <a:tc>
+                  <a:txBody>
+                    <a:bodyPr/>
+                    <a:p>
+                      <a:pPr algn="ctr">
+                        <a:buNone/>
+                      </a:pPr>
+                      <a:r>
+                        <a:rPr lang="x-none"/>
+                        <a:t>10</a:t>
+                      </a:r>
+                      <a:endParaRPr lang="x-none"/>
+                    </a:p>
+                  </a:txBody>
+                  <a:tcPr/>
+                </a:tc>
+              </a:tr>
+              <a:tr h="381000">
+                <a:tc>
+                  <a:txBody>
+                    <a:bodyPr/>
+                    <a:p>
+                      <a:pPr algn="ctr">
+                        <a:buNone/>
+                      </a:pPr>
+                      <a:r>
+                        <a:rPr lang="x-none"/>
+                        <a:t>9</a:t>
+                      </a:r>
+                      <a:endParaRPr lang="x-none"/>
+                    </a:p>
+                  </a:txBody>
+                  <a:tcPr/>
+                </a:tc>
+                <a:tc>
+                  <a:txBody>
+                    <a:bodyPr/>
+                    <a:p>
+                      <a:pPr algn="ctr">
+                        <a:buNone/>
+                      </a:pPr>
+                      <a:r>
+                        <a:rPr lang="x-none"/>
+                        <a:t>80</a:t>
+                      </a:r>
+                      <a:endParaRPr lang="x-none"/>
+                    </a:p>
+                  </a:txBody>
+                  <a:tcPr/>
+                </a:tc>
+                <a:tc>
+                  <a:txBody>
+                    <a:bodyPr/>
+                    <a:p>
+                      <a:pPr algn="ctr">
+                        <a:buNone/>
+                      </a:pPr>
+                      <a:r>
+                        <a:rPr lang="x-none"/>
+                        <a:t>19</a:t>
+                      </a:r>
+                      <a:endParaRPr lang="x-none"/>
+                    </a:p>
+                  </a:txBody>
+                  <a:tcPr/>
+                </a:tc>
+              </a:tr>
+              <a:tr h="381000">
+                <a:tc>
+                  <a:txBody>
+                    <a:bodyPr/>
+                    <a:p>
+                      <a:pPr algn="ctr">
+                        <a:buNone/>
+                      </a:pPr>
+                      <a:r>
+                        <a:rPr lang="x-none"/>
+                        <a:t>10</a:t>
+                      </a:r>
+                      <a:endParaRPr lang="x-none"/>
+                    </a:p>
+                  </a:txBody>
+                  <a:tcPr/>
+                </a:tc>
+                <a:tc>
+                  <a:txBody>
+                    <a:bodyPr/>
+                    <a:p>
+                      <a:pPr algn="ctr">
+                        <a:buNone/>
+                      </a:pPr>
+                      <a:r>
+                        <a:rPr lang="x-none"/>
+                        <a:t>407</a:t>
+                      </a:r>
+                      <a:endParaRPr lang="x-none"/>
+                    </a:p>
+                  </a:txBody>
+                  <a:tcPr/>
+                </a:tc>
+                <a:tc>
+                  <a:txBody>
+                    <a:bodyPr/>
+                    <a:p>
+                      <a:pPr algn="ctr">
+                        <a:buNone/>
+                      </a:pPr>
+                      <a:r>
+                        <a:rPr lang="x-none"/>
+                        <a:t>30</a:t>
+                      </a:r>
+                      <a:endParaRPr lang="x-none"/>
+                    </a:p>
+                  </a:txBody>
+                  <a:tcPr/>
+                </a:tc>
+              </a:tr>
+              <a:tr h="381000">
+                <a:tc>
+                  <a:txBody>
+                    <a:bodyPr/>
+                    <a:p>
+                      <a:pPr algn="ctr">
+                        <a:buNone/>
+                      </a:pPr>
+                      <a:r>
+                        <a:rPr lang="x-none"/>
+                        <a:t>11</a:t>
+                      </a:r>
+                      <a:endParaRPr lang="x-none"/>
+                    </a:p>
+                  </a:txBody>
+                  <a:tcPr/>
+                </a:tc>
+                <a:tc>
+                  <a:txBody>
+                    <a:bodyPr/>
+                    <a:p>
+                      <a:pPr algn="ctr">
+                        <a:buNone/>
+                      </a:pPr>
+                      <a:r>
+                        <a:rPr lang="x-none"/>
+                        <a:t>5121</a:t>
+                      </a:r>
+                      <a:endParaRPr lang="x-none"/>
+                    </a:p>
+                  </a:txBody>
+                  <a:tcPr/>
+                </a:tc>
+                <a:tc>
+                  <a:txBody>
+                    <a:bodyPr/>
+                    <a:p>
+                      <a:pPr algn="ctr">
+                        <a:buNone/>
+                      </a:pPr>
+                      <a:r>
+                        <a:rPr lang="x-none"/>
+                        <a:t>100</a:t>
+                      </a:r>
+                      <a:endParaRPr lang="x-none"/>
+                    </a:p>
+                  </a:txBody>
+                  <a:tcPr/>
+                </a:tc>
+              </a:tr>
+              <a:tr h="381000">
+                <a:tc>
+                  <a:txBody>
+                    <a:bodyPr/>
+                    <a:p>
+                      <a:pPr algn="ctr">
+                        <a:buNone/>
+                      </a:pPr>
+                      <a:r>
+                        <a:rPr lang="x-none"/>
+                        <a:t>12</a:t>
+                      </a:r>
+                      <a:endParaRPr lang="x-none"/>
+                    </a:p>
+                  </a:txBody>
+                  <a:tcPr/>
+                </a:tc>
+                <a:tc>
+                  <a:txBody>
+                    <a:bodyPr/>
+                    <a:p>
+                      <a:pPr algn="ctr">
+                        <a:buNone/>
+                      </a:pPr>
+                      <a:r>
+                        <a:rPr lang="x-none"/>
+                        <a:t>61310</a:t>
+                      </a:r>
+                      <a:endParaRPr lang="x-none"/>
+                    </a:p>
+                  </a:txBody>
+                  <a:tcPr/>
+                </a:tc>
+                <a:tc>
+                  <a:txBody>
+                    <a:bodyPr/>
+                    <a:p>
+                      <a:pPr algn="ctr">
+                        <a:buNone/>
+                      </a:pPr>
+                      <a:r>
+                        <a:rPr lang="x-none"/>
+                        <a:t>198</a:t>
+                      </a:r>
+                      <a:endParaRPr lang="x-none"/>
+                    </a:p>
+                  </a:txBody>
+                  <a:tcPr/>
+                </a:tc>
+              </a:tr>
+              <a:tr h="381000">
+                <a:tc>
+                  <a:txBody>
+                    <a:bodyPr/>
+                    <a:p>
+                      <a:pPr algn="ctr">
+                        <a:buNone/>
+                      </a:pPr>
+                      <a:r>
+                        <a:rPr lang="x-none"/>
+                        <a:t>13</a:t>
+                      </a:r>
+                      <a:endParaRPr lang="x-none"/>
+                    </a:p>
+                  </a:txBody>
+                  <a:tcPr/>
+                </a:tc>
+                <a:tc>
+                  <a:txBody>
+                    <a:bodyPr/>
+                    <a:p>
+                      <a:pPr algn="ctr">
+                        <a:buNone/>
+                      </a:pPr>
+                      <a:r>
+                        <a:rPr lang="x-none"/>
+                        <a:t>&gt;120000</a:t>
+                      </a:r>
+                      <a:endParaRPr lang="x-none"/>
+                    </a:p>
+                  </a:txBody>
+                  <a:tcPr/>
+                </a:tc>
+                <a:tc>
+                  <a:txBody>
+                    <a:bodyPr/>
+                    <a:p>
+                      <a:pPr algn="ctr">
+                        <a:buNone/>
+                      </a:pPr>
+                      <a:r>
+                        <a:rPr lang="x-none"/>
+                        <a:t>1448</a:t>
+                      </a:r>
+                      <a:endParaRPr lang="x-none"/>
+                    </a:p>
+                  </a:txBody>
+                  <a:tcPr/>
+                </a:tc>
+              </a:tr>
+              <a:tr h="381000">
+                <a:tc>
+                  <a:txBody>
+                    <a:bodyPr/>
+                    <a:p>
+                      <a:pPr algn="ctr">
+                        <a:buNone/>
+                      </a:pPr>
+                      <a:r>
+                        <a:rPr lang="x-none"/>
+                        <a:t>14</a:t>
+                      </a:r>
+                      <a:endParaRPr lang="x-none"/>
+                    </a:p>
+                  </a:txBody>
+                  <a:tcPr/>
+                </a:tc>
+                <a:tc>
+                  <a:txBody>
+                    <a:bodyPr/>
+                    <a:p>
+                      <a:pPr algn="ctr">
+                        <a:buNone/>
+                      </a:pPr>
+                      <a:r>
+                        <a:rPr lang="x-none" sz="1800">
+                          <a:sym typeface="+mn-ea"/>
+                        </a:rPr>
+                        <a:t>&gt;1000000</a:t>
+                      </a:r>
+                    </a:p>
+                  </a:txBody>
+                  <a:tcPr/>
+                </a:tc>
+                <a:tc>
+                  <a:txBody>
+                    <a:bodyPr/>
+                    <a:p>
+                      <a:pPr algn="ctr">
+                        <a:buNone/>
+                      </a:pPr>
+                      <a:r>
+                        <a:rPr lang="x-none"/>
+                        <a:t>11948</a:t>
+                      </a:r>
+                      <a:endParaRPr lang="x-none"/>
+                    </a:p>
+                  </a:txBody>
+                  <a:tcPr/>
+                </a:tc>
+              </a:tr>
+              <a:tr h="381000">
+                <a:tc>
+                  <a:txBody>
+                    <a:bodyPr/>
+                    <a:p>
+                      <a:pPr algn="ctr">
+                        <a:buNone/>
+                      </a:pPr>
+                      <a:r>
+                        <a:rPr lang="x-none"/>
+                        <a:t>15</a:t>
+                      </a:r>
+                      <a:endParaRPr lang="x-none"/>
+                    </a:p>
+                  </a:txBody>
+                  <a:tcPr/>
+                </a:tc>
+                <a:tc>
+                  <a:txBody>
+                    <a:bodyPr/>
+                    <a:p>
+                      <a:pPr algn="ctr">
+                        <a:buNone/>
+                      </a:pPr>
+                      <a:r>
+                        <a:rPr lang="x-none" sz="1800">
+                          <a:sym typeface="+mn-ea"/>
+                        </a:rPr>
+                        <a:t>&gt;1000000</a:t>
+                      </a:r>
+                    </a:p>
+                  </a:txBody>
+                  <a:tcPr/>
+                </a:tc>
+                <a:tc>
+                  <a:txBody>
+                    <a:bodyPr/>
+                    <a:p>
+                      <a:pPr algn="ctr">
+                        <a:buNone/>
+                      </a:pPr>
+                      <a:r>
+                        <a:rPr lang="x-none"/>
+                        <a:t>110179</a:t>
+                      </a:r>
+                      <a:endParaRPr lang="x-none"/>
+                    </a:p>
+                  </a:txBody>
+                  <a:tcPr/>
+                </a:tc>
+              </a:tr>
+            </a:tbl>
+          </a:graphicData>
+        </a:graphic>
+      </p:graphicFrame>
     </p:spTree>
   </p:cSld>
   <p:clrMapOvr>

</xml_diff>

<commit_message>
change presentation and build
</commit_message>
<xml_diff>
--- a/documents/presentation.pptx
+++ b/documents/presentation.pptx
@@ -5,7 +5,7 @@
     <p:sldMasterId id="2147483648" r:id="rId1"/>
   </p:sldMasterIdLst>
   <p:notesMasterIdLst>
-    <p:notesMasterId r:id="rId14"/>
+    <p:notesMasterId r:id="rId15"/>
   </p:notesMasterIdLst>
   <p:sldIdLst>
     <p:sldId id="256" r:id="rId3"/>
@@ -18,7 +18,8 @@
     <p:sldId id="278" r:id="rId10"/>
     <p:sldId id="284" r:id="rId11"/>
     <p:sldId id="286" r:id="rId12"/>
-    <p:sldId id="262" r:id="rId13"/>
+    <p:sldId id="288" r:id="rId13"/>
+    <p:sldId id="262" r:id="rId14"/>
   </p:sldIdLst>
   <p:sldSz cx="12192000" cy="6858000"/>
   <p:notesSz cx="6858000" cy="9144000"/>
@@ -3697,6 +3698,123 @@
 </file>
 
 <file path=ppt/slides/slide11.xml><?xml version="1.0" encoding="utf-8"?>
+<p:sld xmlns:a="http://schemas.openxmlformats.org/drawingml/2006/main" xmlns:r="http://schemas.openxmlformats.org/officeDocument/2006/relationships" xmlns:p="http://schemas.openxmlformats.org/presentationml/2006/main">
+  <p:cSld>
+    <p:spTree>
+      <p:nvGrpSpPr>
+        <p:cNvPr id="1" name=""/>
+        <p:cNvGrpSpPr/>
+        <p:nvPr/>
+      </p:nvGrpSpPr>
+      <p:grpSpPr/>
+      <p:sp>
+        <p:nvSpPr>
+          <p:cNvPr id="2" name="Title 1"/>
+          <p:cNvSpPr>
+            <a:spLocks noGrp="1"/>
+          </p:cNvSpPr>
+          <p:nvPr>
+            <p:ph type="title"/>
+          </p:nvPr>
+        </p:nvSpPr>
+        <p:spPr>
+          <a:xfrm>
+            <a:off x="593090" y="7938"/>
+            <a:ext cx="10972800" cy="1143000"/>
+          </a:xfrm>
+        </p:spPr>
+        <p:txBody>
+          <a:bodyPr/>
+          <a:p>
+            <a:r>
+              <a:rPr lang="x-none" altLang="en-US" sz="3600"/>
+              <a:t>Примеры работы программы</a:t>
+            </a:r>
+            <a:endParaRPr lang="x-none" altLang="en-US" sz="3600"/>
+          </a:p>
+        </p:txBody>
+      </p:sp>
+      <p:pic>
+        <p:nvPicPr>
+          <p:cNvPr id="3" name="Picture 2"/>
+          <p:cNvPicPr>
+            <a:picLocks noChangeAspect="1"/>
+          </p:cNvPicPr>
+          <p:nvPr/>
+        </p:nvPicPr>
+        <p:blipFill>
+          <a:blip r:embed="rId1"/>
+          <a:stretch>
+            <a:fillRect/>
+          </a:stretch>
+        </p:blipFill>
+        <p:spPr>
+          <a:xfrm>
+            <a:off x="247015" y="1094105"/>
+            <a:ext cx="6266815" cy="1504950"/>
+          </a:xfrm>
+          <a:prstGeom prst="rect">
+            <a:avLst/>
+          </a:prstGeom>
+        </p:spPr>
+      </p:pic>
+      <p:pic>
+        <p:nvPicPr>
+          <p:cNvPr id="4" name="Picture 3"/>
+          <p:cNvPicPr>
+            <a:picLocks noChangeAspect="1"/>
+          </p:cNvPicPr>
+          <p:nvPr/>
+        </p:nvPicPr>
+        <p:blipFill>
+          <a:blip r:embed="rId2"/>
+          <a:stretch>
+            <a:fillRect/>
+          </a:stretch>
+        </p:blipFill>
+        <p:spPr>
+          <a:xfrm>
+            <a:off x="252095" y="2846705"/>
+            <a:ext cx="6257290" cy="3161665"/>
+          </a:xfrm>
+          <a:prstGeom prst="rect">
+            <a:avLst/>
+          </a:prstGeom>
+        </p:spPr>
+      </p:pic>
+      <p:pic>
+        <p:nvPicPr>
+          <p:cNvPr id="5" name="Picture 4"/>
+          <p:cNvPicPr>
+            <a:picLocks noChangeAspect="1"/>
+          </p:cNvPicPr>
+          <p:nvPr/>
+        </p:nvPicPr>
+        <p:blipFill>
+          <a:blip r:embed="rId3"/>
+          <a:stretch>
+            <a:fillRect/>
+          </a:stretch>
+        </p:blipFill>
+        <p:spPr>
+          <a:xfrm>
+            <a:off x="7314565" y="1049020"/>
+            <a:ext cx="4023995" cy="5022850"/>
+          </a:xfrm>
+          <a:prstGeom prst="rect">
+            <a:avLst/>
+          </a:prstGeom>
+        </p:spPr>
+      </p:pic>
+    </p:spTree>
+  </p:cSld>
+  <p:clrMapOvr>
+    <a:masterClrMapping/>
+  </p:clrMapOvr>
+</p:sld>
+</file>
+
+<file path=ppt/slides/slide12.xml><?xml version="1.0" encoding="utf-8"?>
 <p:sld xmlns:a="http://schemas.openxmlformats.org/drawingml/2006/main" xmlns:r="http://schemas.openxmlformats.org/officeDocument/2006/relationships" xmlns:p="http://schemas.openxmlformats.org/presentationml/2006/main">
   <p:cSld>
     <p:spTree>

</xml_diff>